<commit_message>
feature: MongoDB Integrtaion  CR:suprusty SANITY:Yes
</commit_message>
<xml_diff>
--- a/CMAD_CISCOBLOG.pptx
+++ b/CMAD_CISCOBLOG.pptx
@@ -1,6 +1,6 @@
 
 <file path=ppt/presentation.xml><?xml version="1.0" encoding="utf-8"?>
-<p:presentation xmlns:a="http://schemas.openxmlformats.org/drawingml/2006/main" xmlns:r="http://schemas.openxmlformats.org/officeDocument/2006/relationships" xmlns:p="http://schemas.openxmlformats.org/presentationml/2006/main" embedTrueTypeFonts="1" autoCompressPictures="0">
+<p:presentation xmlns:a="http://schemas.openxmlformats.org/drawingml/2006/main" xmlns:r="http://schemas.openxmlformats.org/officeDocument/2006/relationships" xmlns:p="http://schemas.openxmlformats.org/presentationml/2006/main" saveSubsetFonts="1" autoCompressPictures="0">
   <p:sldMasterIdLst>
     <p:sldMasterId id="2147483881" r:id="rId1"/>
   </p:sldMasterIdLst>
@@ -2247,7 +2247,7 @@
           <a:p>
             <a:fld id="{62B32D8C-52DD-4DA0-BEA4-61BCF7C2EDF9}" type="datetimeFigureOut">
               <a:rPr lang="en-GB" smtClean="0"/>
-              <a:t>15/02/2018</a:t>
+              <a:t>16/02/2018</a:t>
             </a:fld>
             <a:endParaRPr lang="en-GB"/>
           </a:p>
@@ -2412,7 +2412,7 @@
           <a:p>
             <a:fld id="{B8B76084-FF89-C546-BB62-0004C5E16AD5}" type="datetimeFigureOut">
               <a:rPr lang="en-US" smtClean="0"/>
-              <a:t>2/15/18</a:t>
+              <a:t>2/16/18</a:t>
             </a:fld>
             <a:endParaRPr lang="en-US"/>
           </a:p>
@@ -2765,6 +2765,264 @@
 </file>
 
 <file path=ppt/notesSlides/notesSlide2.xml><?xml version="1.0" encoding="utf-8"?>
+<p:notes xmlns:a="http://schemas.openxmlformats.org/drawingml/2006/main" xmlns:r="http://schemas.openxmlformats.org/officeDocument/2006/relationships" xmlns:p="http://schemas.openxmlformats.org/presentationml/2006/main">
+  <p:cSld>
+    <p:spTree>
+      <p:nvGrpSpPr>
+        <p:cNvPr id="1" name=""/>
+        <p:cNvGrpSpPr/>
+        <p:nvPr/>
+      </p:nvGrpSpPr>
+      <p:grpSpPr>
+        <a:xfrm>
+          <a:off x="0" y="0"/>
+          <a:ext cx="0" cy="0"/>
+          <a:chOff x="0" y="0"/>
+          <a:chExt cx="0" cy="0"/>
+        </a:xfrm>
+      </p:grpSpPr>
+      <p:sp>
+        <p:nvSpPr>
+          <p:cNvPr id="2" name="Slide Image Placeholder 1"/>
+          <p:cNvSpPr>
+            <a:spLocks noGrp="1" noRot="1" noChangeAspect="1"/>
+          </p:cNvSpPr>
+          <p:nvPr>
+            <p:ph type="sldImg"/>
+          </p:nvPr>
+        </p:nvSpPr>
+        <p:spPr/>
+      </p:sp>
+      <p:sp>
+        <p:nvSpPr>
+          <p:cNvPr id="3" name="Notes Placeholder 2"/>
+          <p:cNvSpPr>
+            <a:spLocks noGrp="1"/>
+          </p:cNvSpPr>
+          <p:nvPr>
+            <p:ph type="body" idx="1"/>
+          </p:nvPr>
+        </p:nvSpPr>
+        <p:spPr/>
+        <p:txBody>
+          <a:bodyPr/>
+          <a:lstStyle/>
+          <a:p>
+            <a:r>
+              <a:rPr lang="en-US" dirty="0"/>
+              <a:t>Have option for various kind of search</a:t>
+            </a:r>
+          </a:p>
+        </p:txBody>
+      </p:sp>
+      <p:sp>
+        <p:nvSpPr>
+          <p:cNvPr id="4" name="Slide Number Placeholder 3"/>
+          <p:cNvSpPr>
+            <a:spLocks noGrp="1"/>
+          </p:cNvSpPr>
+          <p:nvPr>
+            <p:ph type="sldNum" sz="quarter" idx="10"/>
+          </p:nvPr>
+        </p:nvSpPr>
+        <p:spPr/>
+        <p:txBody>
+          <a:bodyPr/>
+          <a:lstStyle/>
+          <a:p>
+            <a:fld id="{7B2FCB79-2C0C-F84D-A224-30C295992FCE}" type="slidenum">
+              <a:rPr lang="en-US" smtClean="0"/>
+              <a:t>3</a:t>
+            </a:fld>
+            <a:endParaRPr lang="en-US"/>
+          </a:p>
+        </p:txBody>
+      </p:sp>
+    </p:spTree>
+    <p:extLst>
+      <p:ext uri="{BB962C8B-B14F-4D97-AF65-F5344CB8AC3E}">
+        <p14:creationId xmlns:p14="http://schemas.microsoft.com/office/powerpoint/2010/main" val="621016434"/>
+      </p:ext>
+    </p:extLst>
+  </p:cSld>
+  <p:clrMapOvr>
+    <a:masterClrMapping/>
+  </p:clrMapOvr>
+</p:notes>
+</file>
+
+<file path=ppt/notesSlides/notesSlide3.xml><?xml version="1.0" encoding="utf-8"?>
+<p:notes xmlns:a="http://schemas.openxmlformats.org/drawingml/2006/main" xmlns:r="http://schemas.openxmlformats.org/officeDocument/2006/relationships" xmlns:p="http://schemas.openxmlformats.org/presentationml/2006/main">
+  <p:cSld>
+    <p:spTree>
+      <p:nvGrpSpPr>
+        <p:cNvPr id="1" name=""/>
+        <p:cNvGrpSpPr/>
+        <p:nvPr/>
+      </p:nvGrpSpPr>
+      <p:grpSpPr>
+        <a:xfrm>
+          <a:off x="0" y="0"/>
+          <a:ext cx="0" cy="0"/>
+          <a:chOff x="0" y="0"/>
+          <a:chExt cx="0" cy="0"/>
+        </a:xfrm>
+      </p:grpSpPr>
+      <p:sp>
+        <p:nvSpPr>
+          <p:cNvPr id="2" name="Slide Image Placeholder 1"/>
+          <p:cNvSpPr>
+            <a:spLocks noGrp="1" noRot="1" noChangeAspect="1"/>
+          </p:cNvSpPr>
+          <p:nvPr>
+            <p:ph type="sldImg"/>
+          </p:nvPr>
+        </p:nvSpPr>
+        <p:spPr/>
+      </p:sp>
+      <p:sp>
+        <p:nvSpPr>
+          <p:cNvPr id="3" name="Notes Placeholder 2"/>
+          <p:cNvSpPr>
+            <a:spLocks noGrp="1"/>
+          </p:cNvSpPr>
+          <p:nvPr>
+            <p:ph type="body" idx="1"/>
+          </p:nvPr>
+        </p:nvSpPr>
+        <p:spPr/>
+        <p:txBody>
+          <a:bodyPr/>
+          <a:lstStyle/>
+          <a:p>
+            <a:r>
+              <a:rPr lang="en-US" dirty="0"/>
+              <a:t>Have Various kind of search</a:t>
+            </a:r>
+          </a:p>
+        </p:txBody>
+      </p:sp>
+      <p:sp>
+        <p:nvSpPr>
+          <p:cNvPr id="4" name="Slide Number Placeholder 3"/>
+          <p:cNvSpPr>
+            <a:spLocks noGrp="1"/>
+          </p:cNvSpPr>
+          <p:nvPr>
+            <p:ph type="sldNum" sz="quarter" idx="10"/>
+          </p:nvPr>
+        </p:nvSpPr>
+        <p:spPr/>
+        <p:txBody>
+          <a:bodyPr/>
+          <a:lstStyle/>
+          <a:p>
+            <a:fld id="{7B2FCB79-2C0C-F84D-A224-30C295992FCE}" type="slidenum">
+              <a:rPr lang="en-US" smtClean="0"/>
+              <a:t>5</a:t>
+            </a:fld>
+            <a:endParaRPr lang="en-US"/>
+          </a:p>
+        </p:txBody>
+      </p:sp>
+    </p:spTree>
+    <p:extLst>
+      <p:ext uri="{BB962C8B-B14F-4D97-AF65-F5344CB8AC3E}">
+        <p14:creationId xmlns:p14="http://schemas.microsoft.com/office/powerpoint/2010/main" val="1765035410"/>
+      </p:ext>
+    </p:extLst>
+  </p:cSld>
+  <p:clrMapOvr>
+    <a:masterClrMapping/>
+  </p:clrMapOvr>
+</p:notes>
+</file>
+
+<file path=ppt/notesSlides/notesSlide4.xml><?xml version="1.0" encoding="utf-8"?>
+<p:notes xmlns:a="http://schemas.openxmlformats.org/drawingml/2006/main" xmlns:r="http://schemas.openxmlformats.org/officeDocument/2006/relationships" xmlns:p="http://schemas.openxmlformats.org/presentationml/2006/main">
+  <p:cSld>
+    <p:spTree>
+      <p:nvGrpSpPr>
+        <p:cNvPr id="1" name=""/>
+        <p:cNvGrpSpPr/>
+        <p:nvPr/>
+      </p:nvGrpSpPr>
+      <p:grpSpPr>
+        <a:xfrm>
+          <a:off x="0" y="0"/>
+          <a:ext cx="0" cy="0"/>
+          <a:chOff x="0" y="0"/>
+          <a:chExt cx="0" cy="0"/>
+        </a:xfrm>
+      </p:grpSpPr>
+      <p:sp>
+        <p:nvSpPr>
+          <p:cNvPr id="2" name="Slide Image Placeholder 1"/>
+          <p:cNvSpPr>
+            <a:spLocks noGrp="1" noRot="1" noChangeAspect="1"/>
+          </p:cNvSpPr>
+          <p:nvPr>
+            <p:ph type="sldImg"/>
+          </p:nvPr>
+        </p:nvSpPr>
+        <p:spPr/>
+      </p:sp>
+      <p:sp>
+        <p:nvSpPr>
+          <p:cNvPr id="3" name="Notes Placeholder 2"/>
+          <p:cNvSpPr>
+            <a:spLocks noGrp="1"/>
+          </p:cNvSpPr>
+          <p:nvPr>
+            <p:ph type="body" idx="1"/>
+          </p:nvPr>
+        </p:nvSpPr>
+        <p:spPr/>
+        <p:txBody>
+          <a:bodyPr/>
+          <a:lstStyle/>
+          <a:p>
+            <a:endParaRPr lang="en-US" dirty="0"/>
+          </a:p>
+        </p:txBody>
+      </p:sp>
+      <p:sp>
+        <p:nvSpPr>
+          <p:cNvPr id="4" name="Slide Number Placeholder 3"/>
+          <p:cNvSpPr>
+            <a:spLocks noGrp="1"/>
+          </p:cNvSpPr>
+          <p:nvPr>
+            <p:ph type="sldNum" sz="quarter" idx="10"/>
+          </p:nvPr>
+        </p:nvSpPr>
+        <p:spPr/>
+        <p:txBody>
+          <a:bodyPr/>
+          <a:lstStyle/>
+          <a:p>
+            <a:fld id="{7B2FCB79-2C0C-F84D-A224-30C295992FCE}" type="slidenum">
+              <a:rPr lang="en-US" smtClean="0"/>
+              <a:t>9</a:t>
+            </a:fld>
+            <a:endParaRPr lang="en-US"/>
+          </a:p>
+        </p:txBody>
+      </p:sp>
+    </p:spTree>
+    <p:extLst>
+      <p:ext uri="{BB962C8B-B14F-4D97-AF65-F5344CB8AC3E}">
+        <p14:creationId xmlns:p14="http://schemas.microsoft.com/office/powerpoint/2010/main" val="1403580674"/>
+      </p:ext>
+    </p:extLst>
+  </p:cSld>
+  <p:clrMapOvr>
+    <a:masterClrMapping/>
+  </p:clrMapOvr>
+</p:notes>
+</file>
+
+<file path=ppt/notesSlides/notesSlide5.xml><?xml version="1.0" encoding="utf-8"?>
 <p:notes xmlns:a="http://schemas.openxmlformats.org/drawingml/2006/main" xmlns:r="http://schemas.openxmlformats.org/officeDocument/2006/relationships" xmlns:p="http://schemas.openxmlformats.org/presentationml/2006/main">
   <p:cSld>
     <p:spTree>
@@ -5486,7 +5744,7 @@
           <a:p>
             <a:fld id="{1A463D16-F9E2-C944-A2BE-339FD62C45EF}" type="datetimeFigureOut">
               <a:rPr lang="en-US" smtClean="0"/>
-              <a:t>2/15/18</a:t>
+              <a:t>2/16/18</a:t>
             </a:fld>
             <a:endParaRPr lang="en-US"/>
           </a:p>
@@ -6313,7 +6571,13 @@
           <p:cNvGraphicFramePr>
             <a:graphicFrameLocks noGrp="1"/>
           </p:cNvGraphicFramePr>
-          <p:nvPr/>
+          <p:nvPr>
+            <p:extLst>
+              <p:ext uri="{D42A27DB-BD31-4B8C-83A1-F6EECF244321}">
+                <p14:modId xmlns:p14="http://schemas.microsoft.com/office/powerpoint/2010/main" val="428327682"/>
+              </p:ext>
+            </p:extLst>
+          </p:nvPr>
         </p:nvGraphicFramePr>
         <p:xfrm>
           <a:off x="838200" y="783771"/>
@@ -6532,7 +6796,7 @@
                         <a:rPr lang="en-US" sz="1100" dirty="0">
                           <a:effectLst/>
                         </a:rPr>
-                        <a:t>Get message</a:t>
+                        <a:t>Get Profile</a:t>
                       </a:r>
                       <a:endParaRPr lang="en-IN" sz="1100" dirty="0">
                         <a:effectLst/>
@@ -6830,7 +7094,7 @@
                           <a:spcPct val="115000"/>
                         </a:lnSpc>
                       </a:pPr>
-                      <a:endParaRPr lang="en-IN" sz="1100">
+                      <a:endParaRPr lang="en-IN" sz="1100" dirty="0">
                         <a:effectLst/>
                         <a:latin typeface="Calibri" panose="020F0502020204030204" pitchFamily="34" charset="0"/>
                         <a:cs typeface="Times New Roman" panose="02020603050405020304" pitchFamily="18" charset="0"/>
@@ -6937,12 +7201,12 @@
                         </a:spcAft>
                       </a:pPr>
                       <a:r>
-                        <a:rPr lang="en-US" sz="1100">
-                          <a:effectLst/>
-                        </a:rPr>
-                        <a:t>Delete message</a:t>
-                      </a:r>
-                      <a:endParaRPr lang="en-IN" sz="1100">
+                        <a:rPr lang="en-US" sz="1100" dirty="0">
+                          <a:effectLst/>
+                        </a:rPr>
+                        <a:t>Delete Profile</a:t>
+                      </a:r>
+                      <a:endParaRPr lang="en-IN" sz="1100" dirty="0">
                         <a:effectLst/>
                         <a:latin typeface="Calibri" panose="020F0502020204030204" pitchFamily="34" charset="0"/>
                         <a:ea typeface="Calibri" panose="020F0502020204030204" pitchFamily="34" charset="0"/>
@@ -7345,12 +7609,12 @@
                         </a:spcAft>
                       </a:pPr>
                       <a:r>
-                        <a:rPr lang="en-US" sz="1100">
-                          <a:effectLst/>
-                        </a:rPr>
-                        <a:t>Edit message</a:t>
-                      </a:r>
-                      <a:endParaRPr lang="en-IN" sz="1100">
+                        <a:rPr lang="en-US" sz="1100" dirty="0">
+                          <a:effectLst/>
+                        </a:rPr>
+                        <a:t>Edit Profile</a:t>
+                      </a:r>
+                      <a:endParaRPr lang="en-IN" sz="1100" dirty="0">
                         <a:effectLst/>
                         <a:latin typeface="Calibri" panose="020F0502020204030204" pitchFamily="34" charset="0"/>
                         <a:ea typeface="Calibri" panose="020F0502020204030204" pitchFamily="34" charset="0"/>
@@ -7875,12 +8139,12 @@
                         </a:spcAft>
                       </a:pPr>
                       <a:r>
-                        <a:rPr lang="en-US" sz="1100">
-                          <a:effectLst/>
-                        </a:rPr>
-                        <a:t>Create message</a:t>
-                      </a:r>
-                      <a:endParaRPr lang="en-IN" sz="1100">
+                        <a:rPr lang="en-US" sz="1100" dirty="0">
+                          <a:effectLst/>
+                        </a:rPr>
+                        <a:t>Create Profile</a:t>
+                      </a:r>
+                      <a:endParaRPr lang="en-IN" sz="1100" dirty="0">
                         <a:effectLst/>
                         <a:latin typeface="Calibri" panose="020F0502020204030204" pitchFamily="34" charset="0"/>
                         <a:ea typeface="Calibri" panose="020F0502020204030204" pitchFamily="34" charset="0"/>
@@ -8336,7 +8600,7 @@
           <p:nvPr>
             <p:extLst>
               <p:ext uri="{D42A27DB-BD31-4B8C-83A1-F6EECF244321}">
-                <p14:modId xmlns:p14="http://schemas.microsoft.com/office/powerpoint/2010/main" val="1966772966"/>
+                <p14:modId xmlns:p14="http://schemas.microsoft.com/office/powerpoint/2010/main" val="2491461892"/>
               </p:ext>
             </p:extLst>
           </p:nvPr>
@@ -8558,7 +8822,7 @@
                         <a:rPr lang="en-US" sz="1100" dirty="0">
                           <a:effectLst/>
                         </a:rPr>
-                        <a:t>Get message</a:t>
+                        <a:t>Get Blogs</a:t>
                       </a:r>
                       <a:endParaRPr lang="en-IN" sz="1100" dirty="0">
                         <a:effectLst/>
@@ -8587,19 +8851,7 @@
                         <a:rPr lang="en-US" sz="1000" dirty="0">
                           <a:effectLst/>
                         </a:rPr>
-                        <a:t>/blogs/{</a:t>
-                      </a:r>
-                      <a:r>
-                        <a:rPr lang="en-US" sz="1000" dirty="0" err="1">
-                          <a:effectLst/>
-                        </a:rPr>
-                        <a:t>blogId</a:t>
-                      </a:r>
-                      <a:r>
-                        <a:rPr lang="en-US" sz="1000" dirty="0">
-                          <a:effectLst/>
-                        </a:rPr>
-                        <a:t>}</a:t>
+                        <a:t>/blogs</a:t>
                       </a:r>
                       <a:endParaRPr lang="en-IN" sz="1100" dirty="0">
                         <a:effectLst/>
@@ -8963,12 +9215,12 @@
                         </a:spcAft>
                       </a:pPr>
                       <a:r>
-                        <a:rPr lang="en-US" sz="1100">
-                          <a:effectLst/>
-                        </a:rPr>
-                        <a:t>Delete message</a:t>
-                      </a:r>
-                      <a:endParaRPr lang="en-IN" sz="1100">
+                        <a:rPr lang="en-US" sz="1100" dirty="0">
+                          <a:effectLst/>
+                        </a:rPr>
+                        <a:t>Delete Blogs</a:t>
+                      </a:r>
+                      <a:endParaRPr lang="en-IN" sz="1100" dirty="0">
                         <a:effectLst/>
                         <a:latin typeface="Calibri" panose="020F0502020204030204" pitchFamily="34" charset="0"/>
                         <a:ea typeface="Calibri" panose="020F0502020204030204" pitchFamily="34" charset="0"/>
@@ -8983,19 +9235,40 @@
                     <a:bodyPr/>
                     <a:lstStyle/>
                     <a:p>
-                      <a:pPr algn="ctr">
-                        <a:lnSpc>
-                          <a:spcPct val="115000"/>
-                        </a:lnSpc>
+                      <a:pPr marL="0" marR="0" lvl="0" indent="0" algn="ctr" defTabSz="914247" rtl="0" eaLnBrk="1" fontAlgn="auto" latinLnBrk="0" hangingPunct="1">
+                        <a:lnSpc>
+                          <a:spcPct val="115000"/>
+                        </a:lnSpc>
+                        <a:spcBef>
+                          <a:spcPts val="0"/>
+                        </a:spcBef>
                         <a:spcAft>
                           <a:spcPts val="1000"/>
                         </a:spcAft>
+                        <a:buClrTx/>
+                        <a:buSzTx/>
+                        <a:buFontTx/>
+                        <a:buNone/>
+                        <a:tabLst/>
+                        <a:defRPr/>
                       </a:pPr>
                       <a:r>
                         <a:rPr lang="en-US" sz="1000" dirty="0">
                           <a:effectLst/>
                         </a:rPr>
-                        <a:t>/blogs/{</a:t>
+                        <a:t>/profiles/{</a:t>
+                      </a:r>
+                      <a:r>
+                        <a:rPr lang="en-US" sz="1000" dirty="0" err="1">
+                          <a:effectLst/>
+                        </a:rPr>
+                        <a:t>profileId</a:t>
+                      </a:r>
+                      <a:r>
+                        <a:rPr lang="en-US" sz="1000" dirty="0">
+                          <a:effectLst/>
+                        </a:rPr>
+                        <a:t>}/blogs/{</a:t>
                       </a:r>
                       <a:r>
                         <a:rPr lang="en-US" sz="1000" dirty="0" err="1">
@@ -9371,12 +9644,12 @@
                         </a:spcAft>
                       </a:pPr>
                       <a:r>
-                        <a:rPr lang="en-US" sz="1100">
-                          <a:effectLst/>
-                        </a:rPr>
-                        <a:t>Edit message</a:t>
-                      </a:r>
-                      <a:endParaRPr lang="en-IN" sz="1100">
+                        <a:rPr lang="en-US" sz="1100" dirty="0">
+                          <a:effectLst/>
+                        </a:rPr>
+                        <a:t>Edit Blogs</a:t>
+                      </a:r>
+                      <a:endParaRPr lang="en-IN" sz="1100" dirty="0">
                         <a:effectLst/>
                         <a:latin typeface="Calibri" panose="020F0502020204030204" pitchFamily="34" charset="0"/>
                         <a:ea typeface="Calibri" panose="020F0502020204030204" pitchFamily="34" charset="0"/>
@@ -9391,19 +9664,40 @@
                     <a:bodyPr/>
                     <a:lstStyle/>
                     <a:p>
-                      <a:pPr algn="ctr">
-                        <a:lnSpc>
-                          <a:spcPct val="115000"/>
-                        </a:lnSpc>
+                      <a:pPr marL="0" marR="0" lvl="0" indent="0" algn="ctr" defTabSz="914247" rtl="0" eaLnBrk="1" fontAlgn="auto" latinLnBrk="0" hangingPunct="1">
+                        <a:lnSpc>
+                          <a:spcPct val="115000"/>
+                        </a:lnSpc>
+                        <a:spcBef>
+                          <a:spcPts val="0"/>
+                        </a:spcBef>
                         <a:spcAft>
                           <a:spcPts val="1000"/>
                         </a:spcAft>
+                        <a:buClrTx/>
+                        <a:buSzTx/>
+                        <a:buFontTx/>
+                        <a:buNone/>
+                        <a:tabLst/>
+                        <a:defRPr/>
                       </a:pPr>
                       <a:r>
                         <a:rPr lang="en-US" sz="1000" dirty="0">
                           <a:effectLst/>
                         </a:rPr>
-                        <a:t>/blogs/{</a:t>
+                        <a:t>/profiles/{</a:t>
+                      </a:r>
+                      <a:r>
+                        <a:rPr lang="en-US" sz="1000" dirty="0" err="1">
+                          <a:effectLst/>
+                        </a:rPr>
+                        <a:t>profileId</a:t>
+                      </a:r>
+                      <a:r>
+                        <a:rPr lang="en-US" sz="1000" dirty="0">
+                          <a:effectLst/>
+                        </a:rPr>
+                        <a:t>}/blogs/{</a:t>
                       </a:r>
                       <a:r>
                         <a:rPr lang="en-US" sz="1000" dirty="0" err="1">
@@ -9901,12 +10195,12 @@
                         </a:spcAft>
                       </a:pPr>
                       <a:r>
-                        <a:rPr lang="en-US" sz="1100">
-                          <a:effectLst/>
-                        </a:rPr>
-                        <a:t>Create message</a:t>
-                      </a:r>
-                      <a:endParaRPr lang="en-IN" sz="1100">
+                        <a:rPr lang="en-US" sz="1100" dirty="0">
+                          <a:effectLst/>
+                        </a:rPr>
+                        <a:t>Create Blogs</a:t>
+                      </a:r>
+                      <a:endParaRPr lang="en-IN" sz="1100" dirty="0">
                         <a:effectLst/>
                         <a:latin typeface="Calibri" panose="020F0502020204030204" pitchFamily="34" charset="0"/>
                         <a:ea typeface="Calibri" panose="020F0502020204030204" pitchFamily="34" charset="0"/>
@@ -9933,7 +10227,25 @@
                         <a:rPr lang="en-US" sz="1000" dirty="0">
                           <a:effectLst/>
                         </a:rPr>
-                        <a:t>/blogs</a:t>
+                        <a:t>/profiles/{</a:t>
+                      </a:r>
+                      <a:r>
+                        <a:rPr lang="en-US" sz="1000" dirty="0" err="1">
+                          <a:effectLst/>
+                        </a:rPr>
+                        <a:t>profileId</a:t>
+                      </a:r>
+                      <a:r>
+                        <a:rPr lang="en-US" sz="1000">
+                          <a:effectLst/>
+                        </a:rPr>
+                        <a:t>}/</a:t>
+                      </a:r>
+                      <a:r>
+                        <a:rPr lang="en-US" sz="1000" dirty="0">
+                          <a:effectLst/>
+                        </a:rPr>
+                        <a:t>blogs</a:t>
                       </a:r>
                       <a:endParaRPr lang="en-IN" sz="1100" dirty="0">
                         <a:effectLst/>
@@ -10356,14 +10668,14 @@
           <p:nvPr>
             <p:extLst>
               <p:ext uri="{D42A27DB-BD31-4B8C-83A1-F6EECF244321}">
-                <p14:modId xmlns:p14="http://schemas.microsoft.com/office/powerpoint/2010/main" val="2199070911"/>
+                <p14:modId xmlns:p14="http://schemas.microsoft.com/office/powerpoint/2010/main" val="1633693011"/>
               </p:ext>
             </p:extLst>
           </p:nvPr>
         </p:nvGraphicFramePr>
         <p:xfrm>
           <a:off x="838200" y="783771"/>
-          <a:ext cx="10510155" cy="4994620"/>
+          <a:ext cx="10510155" cy="4998604"/>
         </p:xfrm>
         <a:graphic>
           <a:graphicData uri="http://schemas.openxmlformats.org/drawingml/2006/table">
@@ -10628,25 +10940,16 @@
                           <a:ea typeface="Calibri" panose="020F0502020204030204" pitchFamily="34" charset="0"/>
                           <a:cs typeface="Times New Roman" panose="02020603050405020304" pitchFamily="18" charset="0"/>
                         </a:rPr>
-                        <a:t>}/comments/{</a:t>
-                      </a:r>
-                      <a:r>
-                        <a:rPr lang="en-US" sz="1000" dirty="0" err="1">
+                        <a:t>}/</a:t>
+                      </a:r>
+                      <a:r>
+                        <a:rPr lang="en-US" sz="1000">
                           <a:effectLst/>
                           <a:latin typeface="Calibri" panose="020F0502020204030204" pitchFamily="34" charset="0"/>
                           <a:ea typeface="Calibri" panose="020F0502020204030204" pitchFamily="34" charset="0"/>
                           <a:cs typeface="Times New Roman" panose="02020603050405020304" pitchFamily="18" charset="0"/>
                         </a:rPr>
-                        <a:t>commentId</a:t>
-                      </a:r>
-                      <a:r>
-                        <a:rPr lang="en-US" sz="1000" dirty="0">
-                          <a:effectLst/>
-                          <a:latin typeface="Calibri" panose="020F0502020204030204" pitchFamily="34" charset="0"/>
-                          <a:ea typeface="Calibri" panose="020F0502020204030204" pitchFamily="34" charset="0"/>
-                          <a:cs typeface="Times New Roman" panose="02020603050405020304" pitchFamily="18" charset="0"/>
-                        </a:rPr>
-                        <a:t>}</a:t>
+                        <a:t>comments/</a:t>
                       </a:r>
                       <a:endParaRPr lang="en-IN" sz="1100" dirty="0">
                         <a:effectLst/>
@@ -13935,13 +14238,8 @@
             </a:pPr>
             <a:r>
               <a:rPr lang="en-IN" dirty="0"/>
-              <a:t>5)</a:t>
+              <a:t>5)Git Location.</a:t>
             </a:r>
-            <a:r>
-              <a:rPr lang="en-IN"/>
-              <a:t>Git Location.</a:t>
-            </a:r>
-            <a:endParaRPr lang="en-IN" dirty="0"/>
           </a:p>
           <a:p>
             <a:endParaRPr lang="en-US" sz="2800" dirty="0"/>
@@ -13999,7 +14297,7 @@
             </a:r>
             <a:r>
               <a:rPr lang="en-IN" dirty="0"/>
-              <a:t>view the blog posts </a:t>
+              <a:t>view all the blog posts </a:t>
             </a:r>
             <a:endParaRPr lang="en-US" dirty="0"/>
           </a:p>
@@ -14020,7 +14318,7 @@
           <p:nvPr/>
         </p:nvPicPr>
         <p:blipFill>
-          <a:blip r:embed="rId2"/>
+          <a:blip r:embed="rId3"/>
           <a:stretch>
             <a:fillRect/>
           </a:stretch>
@@ -14165,11 +14463,11 @@
           <a:p>
             <a:r>
               <a:rPr lang="en-US" dirty="0"/>
-              <a:t>Landing Page/</a:t>
+              <a:t>Logged-in Page/</a:t>
             </a:r>
             <a:r>
               <a:rPr lang="en-IN" dirty="0"/>
-              <a:t>view the blog posts </a:t>
+              <a:t>view the self blog posts </a:t>
             </a:r>
             <a:endParaRPr lang="en-US" dirty="0"/>
           </a:p>
@@ -14190,7 +14488,7 @@
           <p:nvPr/>
         </p:nvPicPr>
         <p:blipFill>
-          <a:blip r:embed="rId2"/>
+          <a:blip r:embed="rId3"/>
           <a:stretch>
             <a:fillRect/>
           </a:stretch>
@@ -14372,7 +14670,7 @@
           <a:p>
             <a:r>
               <a:rPr lang="en-IN" dirty="0"/>
-              <a:t>Create on blogs Screen</a:t>
+              <a:t>Create blog Screen</a:t>
             </a:r>
             <a:endParaRPr lang="en-US" dirty="0"/>
           </a:p>
@@ -14455,7 +14753,7 @@
           <a:p>
             <a:r>
               <a:rPr lang="en-IN" dirty="0"/>
-              <a:t>Comment on Blog Screen</a:t>
+              <a:t>Comment blog Screen</a:t>
             </a:r>
             <a:endParaRPr lang="en-US" dirty="0"/>
           </a:p>
@@ -14595,7 +14893,7 @@
           <p:nvPr>
             <p:extLst>
               <p:ext uri="{D42A27DB-BD31-4B8C-83A1-F6EECF244321}">
-                <p14:modId xmlns:p14="http://schemas.microsoft.com/office/powerpoint/2010/main" val="3017354557"/>
+                <p14:modId xmlns:p14="http://schemas.microsoft.com/office/powerpoint/2010/main" val="1667320750"/>
               </p:ext>
             </p:extLst>
           </p:nvPr>
@@ -14823,7 +15121,19 @@
                         <a:rPr lang="en-US" sz="1100" dirty="0">
                           <a:effectLst/>
                         </a:rPr>
-                        <a:t>Get message</a:t>
+                        <a:t>Get </a:t>
+                      </a:r>
+                      <a:r>
+                        <a:rPr lang="en-US" sz="1100" dirty="0" err="1">
+                          <a:effectLst/>
+                        </a:rPr>
+                        <a:t>SignUp</a:t>
+                      </a:r>
+                      <a:r>
+                        <a:rPr lang="en-US" sz="1100" dirty="0">
+                          <a:effectLst/>
+                        </a:rPr>
+                        <a:t> Details</a:t>
                       </a:r>
                       <a:endParaRPr lang="en-IN" sz="1100" dirty="0">
                         <a:effectLst/>
@@ -15219,7 +15529,19 @@
                         <a:rPr lang="en-US" sz="1100" dirty="0">
                           <a:effectLst/>
                         </a:rPr>
-                        <a:t>Delete message</a:t>
+                        <a:t>Delete </a:t>
+                      </a:r>
+                      <a:r>
+                        <a:rPr lang="en-US" sz="1100" dirty="0" err="1">
+                          <a:effectLst/>
+                        </a:rPr>
+                        <a:t>SignUp</a:t>
+                      </a:r>
+                      <a:r>
+                        <a:rPr lang="en-US" sz="1100" dirty="0">
+                          <a:effectLst/>
+                        </a:rPr>
+                        <a:t> Details</a:t>
                       </a:r>
                       <a:endParaRPr lang="en-IN" sz="1100" dirty="0">
                         <a:effectLst/>
@@ -15624,12 +15946,24 @@
                         </a:spcAft>
                       </a:pPr>
                       <a:r>
-                        <a:rPr lang="en-US" sz="1100">
-                          <a:effectLst/>
-                        </a:rPr>
-                        <a:t>Edit message</a:t>
-                      </a:r>
-                      <a:endParaRPr lang="en-IN" sz="1100">
+                        <a:rPr lang="en-US" sz="1100" dirty="0">
+                          <a:effectLst/>
+                        </a:rPr>
+                        <a:t>Edit </a:t>
+                      </a:r>
+                      <a:r>
+                        <a:rPr lang="en-US" sz="1100" dirty="0" err="1">
+                          <a:effectLst/>
+                        </a:rPr>
+                        <a:t>SignUp</a:t>
+                      </a:r>
+                      <a:r>
+                        <a:rPr lang="en-US" sz="1100" dirty="0">
+                          <a:effectLst/>
+                        </a:rPr>
+                        <a:t> Details</a:t>
+                      </a:r>
+                      <a:endParaRPr lang="en-IN" sz="1100" dirty="0">
                         <a:effectLst/>
                         <a:latin typeface="Calibri" panose="020F0502020204030204" pitchFamily="34" charset="0"/>
                         <a:ea typeface="Calibri" panose="020F0502020204030204" pitchFamily="34" charset="0"/>
@@ -16154,12 +16488,24 @@
                         </a:spcAft>
                       </a:pPr>
                       <a:r>
-                        <a:rPr lang="en-US" sz="1100">
-                          <a:effectLst/>
-                        </a:rPr>
-                        <a:t>Create message</a:t>
-                      </a:r>
-                      <a:endParaRPr lang="en-IN" sz="1100">
+                        <a:rPr lang="en-US" sz="1100" dirty="0">
+                          <a:effectLst/>
+                        </a:rPr>
+                        <a:t>Create </a:t>
+                      </a:r>
+                      <a:r>
+                        <a:rPr lang="en-US" sz="1100" dirty="0" err="1">
+                          <a:effectLst/>
+                        </a:rPr>
+                        <a:t>SignUp</a:t>
+                      </a:r>
+                      <a:r>
+                        <a:rPr lang="en-US" sz="1100" dirty="0">
+                          <a:effectLst/>
+                        </a:rPr>
+                        <a:t> Details</a:t>
+                      </a:r>
+                      <a:endParaRPr lang="en-IN" sz="1100" dirty="0">
                         <a:effectLst/>
                         <a:latin typeface="Calibri" panose="020F0502020204030204" pitchFamily="34" charset="0"/>
                         <a:ea typeface="Calibri" panose="020F0502020204030204" pitchFamily="34" charset="0"/>

</xml_diff>